<commit_message>
added markdown in single-step_conv-lstm, update
</commit_message>
<xml_diff>
--- a/images/conv_lstm_architecture.pptx
+++ b/images/conv_lstm_architecture.pptx
@@ -104,6 +104,11 @@
       </a:defRPr>
     </a:lvl9pPr>
   </p:defaultTextStyle>
+  <p:extLst>
+    <p:ext uri="{EFAFB233-063F-42B5-8137-9DF3F51BA10A}">
+      <p15:sldGuideLst xmlns:p15="http://schemas.microsoft.com/office/powerpoint/2012/main"/>
+    </p:ext>
+  </p:extLst>
 </p:presentation>
 </file>
 
@@ -256,7 +261,7 @@
           <a:p>
             <a:fld id="{14EE4D02-324A-4105-B472-D09A6289C1BC}" type="datetimeFigureOut">
               <a:rPr lang="it-IT" smtClean="0"/>
-              <a:t>31/01/2024</a:t>
+              <a:t>01/02/2024</a:t>
             </a:fld>
             <a:endParaRPr lang="it-IT"/>
           </a:p>
@@ -456,7 +461,7 @@
           <a:p>
             <a:fld id="{14EE4D02-324A-4105-B472-D09A6289C1BC}" type="datetimeFigureOut">
               <a:rPr lang="it-IT" smtClean="0"/>
-              <a:t>31/01/2024</a:t>
+              <a:t>01/02/2024</a:t>
             </a:fld>
             <a:endParaRPr lang="it-IT"/>
           </a:p>
@@ -666,7 +671,7 @@
           <a:p>
             <a:fld id="{14EE4D02-324A-4105-B472-D09A6289C1BC}" type="datetimeFigureOut">
               <a:rPr lang="it-IT" smtClean="0"/>
-              <a:t>31/01/2024</a:t>
+              <a:t>01/02/2024</a:t>
             </a:fld>
             <a:endParaRPr lang="it-IT"/>
           </a:p>
@@ -866,7 +871,7 @@
           <a:p>
             <a:fld id="{14EE4D02-324A-4105-B472-D09A6289C1BC}" type="datetimeFigureOut">
               <a:rPr lang="it-IT" smtClean="0"/>
-              <a:t>31/01/2024</a:t>
+              <a:t>01/02/2024</a:t>
             </a:fld>
             <a:endParaRPr lang="it-IT"/>
           </a:p>
@@ -1142,7 +1147,7 @@
           <a:p>
             <a:fld id="{14EE4D02-324A-4105-B472-D09A6289C1BC}" type="datetimeFigureOut">
               <a:rPr lang="it-IT" smtClean="0"/>
-              <a:t>31/01/2024</a:t>
+              <a:t>01/02/2024</a:t>
             </a:fld>
             <a:endParaRPr lang="it-IT"/>
           </a:p>
@@ -1410,7 +1415,7 @@
           <a:p>
             <a:fld id="{14EE4D02-324A-4105-B472-D09A6289C1BC}" type="datetimeFigureOut">
               <a:rPr lang="it-IT" smtClean="0"/>
-              <a:t>31/01/2024</a:t>
+              <a:t>01/02/2024</a:t>
             </a:fld>
             <a:endParaRPr lang="it-IT"/>
           </a:p>
@@ -1825,7 +1830,7 @@
           <a:p>
             <a:fld id="{14EE4D02-324A-4105-B472-D09A6289C1BC}" type="datetimeFigureOut">
               <a:rPr lang="it-IT" smtClean="0"/>
-              <a:t>31/01/2024</a:t>
+              <a:t>01/02/2024</a:t>
             </a:fld>
             <a:endParaRPr lang="it-IT"/>
           </a:p>
@@ -1967,7 +1972,7 @@
           <a:p>
             <a:fld id="{14EE4D02-324A-4105-B472-D09A6289C1BC}" type="datetimeFigureOut">
               <a:rPr lang="it-IT" smtClean="0"/>
-              <a:t>31/01/2024</a:t>
+              <a:t>01/02/2024</a:t>
             </a:fld>
             <a:endParaRPr lang="it-IT"/>
           </a:p>
@@ -2080,7 +2085,7 @@
           <a:p>
             <a:fld id="{14EE4D02-324A-4105-B472-D09A6289C1BC}" type="datetimeFigureOut">
               <a:rPr lang="it-IT" smtClean="0"/>
-              <a:t>31/01/2024</a:t>
+              <a:t>01/02/2024</a:t>
             </a:fld>
             <a:endParaRPr lang="it-IT"/>
           </a:p>
@@ -2393,7 +2398,7 @@
           <a:p>
             <a:fld id="{14EE4D02-324A-4105-B472-D09A6289C1BC}" type="datetimeFigureOut">
               <a:rPr lang="it-IT" smtClean="0"/>
-              <a:t>31/01/2024</a:t>
+              <a:t>01/02/2024</a:t>
             </a:fld>
             <a:endParaRPr lang="it-IT"/>
           </a:p>
@@ -2682,7 +2687,7 @@
           <a:p>
             <a:fld id="{14EE4D02-324A-4105-B472-D09A6289C1BC}" type="datetimeFigureOut">
               <a:rPr lang="it-IT" smtClean="0"/>
-              <a:t>31/01/2024</a:t>
+              <a:t>01/02/2024</a:t>
             </a:fld>
             <a:endParaRPr lang="it-IT"/>
           </a:p>
@@ -2925,7 +2930,7 @@
           <a:p>
             <a:fld id="{14EE4D02-324A-4105-B472-D09A6289C1BC}" type="datetimeFigureOut">
               <a:rPr lang="it-IT" smtClean="0"/>
-              <a:t>31/01/2024</a:t>
+              <a:t>01/02/2024</a:t>
             </a:fld>
             <a:endParaRPr lang="it-IT"/>
           </a:p>
@@ -5585,14 +5590,13 @@
           <p:cNvCxnSpPr>
             <a:cxnSpLocks/>
             <a:stCxn id="39" idx="6"/>
-            <a:endCxn id="77" idx="2"/>
           </p:cNvCxnSpPr>
           <p:nvPr/>
         </p:nvCxnSpPr>
         <p:spPr>
           <a:xfrm>
             <a:off x="5321732" y="2471494"/>
-            <a:ext cx="1848471" cy="26259"/>
+            <a:ext cx="1848471" cy="2297151"/>
           </a:xfrm>
           <a:prstGeom prst="straightConnector1">
             <a:avLst/>

</xml_diff>